<commit_message>
Updated typos after teaching
</commit_message>
<xml_diff>
--- a/node/lesson-51-working-with-streams-and-buffers/working-with-streams-and-buffers.pptx
+++ b/node/lesson-51-working-with-streams-and-buffers/working-with-streams-and-buffers.pptx
@@ -28,7 +28,7 @@
   <p:sldSz cx="9144000" cy="6858000" type="screen4x3"/>
   <p:notesSz cx="6858000" cy="9144000"/>
   <p:custDataLst>
-    <p:tags r:id="rId18"/>
+    <p:tags r:id="rId17"/>
   </p:custDataLst>
   <p:defaultTextStyle>
     <a:defPPr>
@@ -125,6 +125,71 @@
       </a:defRPr>
     </a:lvl9pPr>
   </p:defaultTextStyle>
+  <p:extLst>
+    <p:ext uri="{EFAFB233-063F-42B5-8137-9DF3F51BA10A}">
+      <p15:sldGuideLst xmlns:p15="http://schemas.microsoft.com/office/powerpoint/2012/main">
+        <p15:guide id="1" orient="horz" pos="4176">
+          <p15:clr>
+            <a:srgbClr val="A4A3A4"/>
+          </p15:clr>
+        </p15:guide>
+        <p15:guide id="2" orient="horz" pos="607">
+          <p15:clr>
+            <a:srgbClr val="A4A3A4"/>
+          </p15:clr>
+        </p15:guide>
+        <p15:guide id="3" orient="horz" pos="212">
+          <p15:clr>
+            <a:srgbClr val="A4A3A4"/>
+          </p15:clr>
+        </p15:guide>
+        <p15:guide id="4" orient="horz" pos="912">
+          <p15:clr>
+            <a:srgbClr val="A4A3A4"/>
+          </p15:clr>
+        </p15:guide>
+        <p15:guide id="5" orient="horz" pos="3969">
+          <p15:clr>
+            <a:srgbClr val="A4A3A4"/>
+          </p15:clr>
+        </p15:guide>
+        <p15:guide id="6" pos="1267">
+          <p15:clr>
+            <a:srgbClr val="A4A3A4"/>
+          </p15:clr>
+        </p15:guide>
+        <p15:guide id="7" pos="382">
+          <p15:clr>
+            <a:srgbClr val="A4A3A4"/>
+          </p15:clr>
+        </p15:guide>
+        <p15:guide id="8" pos="2880">
+          <p15:clr>
+            <a:srgbClr val="A4A3A4"/>
+          </p15:clr>
+        </p15:guide>
+        <p15:guide id="9" pos="5568">
+          <p15:clr>
+            <a:srgbClr val="A4A3A4"/>
+          </p15:clr>
+        </p15:guide>
+      </p15:sldGuideLst>
+    </p:ext>
+    <p:ext uri="{2D200454-40CA-4A62-9FC3-DE9A4176ACB9}">
+      <p15:notesGuideLst xmlns:p15="http://schemas.microsoft.com/office/powerpoint/2012/main">
+        <p15:guide id="1" orient="horz" pos="2880">
+          <p15:clr>
+            <a:srgbClr val="A4A3A4"/>
+          </p15:clr>
+        </p15:guide>
+        <p15:guide id="2" pos="2160">
+          <p15:clr>
+            <a:srgbClr val="A4A3A4"/>
+          </p15:clr>
+        </p15:guide>
+      </p15:notesGuideLst>
+    </p:ext>
+  </p:extLst>
 </p:presentation>
 </file>
 
@@ -1252,7 +1317,7 @@
   <p:timing>
     <p:tnLst>
       <p:par>
-        <p:cTn xmlns:p14="http://schemas.microsoft.com/office/powerpoint/2010/main" id="1" dur="indefinite" restart="never" nodeType="tmRoot"/>
+        <p:cTn id="1" dur="indefinite" restart="never" nodeType="tmRoot"/>
       </p:par>
     </p:tnLst>
   </p:timing>
@@ -1308,7 +1373,7 @@
           <a:noFill/>
           <a:extLst>
             <a:ext uri="{909E8E84-426E-40dd-AFC4-6F175D3DCCD1}">
-              <a14:hiddenFill xmlns:a14="http://schemas.microsoft.com/office/drawing/2010/main">
+              <a14:hiddenFill xmlns:a14="http://schemas.microsoft.com/office/drawing/2010/main" xmlns="">
                 <a:solidFill>
                   <a:srgbClr val="FFFFFF"/>
                 </a:solidFill>
@@ -1463,7 +1528,7 @@
   <p:timing>
     <p:tnLst>
       <p:par>
-        <p:cTn xmlns:p14="http://schemas.microsoft.com/office/powerpoint/2010/main" id="1" dur="indefinite" restart="never" nodeType="tmRoot"/>
+        <p:cTn id="1" dur="indefinite" restart="never" nodeType="tmRoot"/>
       </p:par>
     </p:tnLst>
   </p:timing>
@@ -1918,7 +1983,7 @@
   <p:timing>
     <p:tnLst>
       <p:par>
-        <p:cTn xmlns:p14="http://schemas.microsoft.com/office/powerpoint/2010/main" id="1" dur="indefinite" restart="never" nodeType="tmRoot"/>
+        <p:cTn id="1" dur="indefinite" restart="never" nodeType="tmRoot"/>
       </p:par>
     </p:tnLst>
   </p:timing>
@@ -2258,7 +2323,7 @@
   <p:timing>
     <p:tnLst>
       <p:par>
-        <p:cTn xmlns:p14="http://schemas.microsoft.com/office/powerpoint/2010/main" id="1" dur="indefinite" restart="never" nodeType="tmRoot"/>
+        <p:cTn id="1" dur="indefinite" restart="never" nodeType="tmRoot"/>
       </p:par>
     </p:tnLst>
   </p:timing>
@@ -2746,7 +2811,7 @@
   <p:timing>
     <p:tnLst>
       <p:par>
-        <p:cTn xmlns:p14="http://schemas.microsoft.com/office/powerpoint/2010/main" id="1" dur="indefinite" restart="never" nodeType="tmRoot"/>
+        <p:cTn id="1" dur="indefinite" restart="never" nodeType="tmRoot"/>
       </p:par>
     </p:tnLst>
   </p:timing>
@@ -3708,7 +3773,7 @@
   <p:timing>
     <p:tnLst>
       <p:par>
-        <p:cTn xmlns:p14="http://schemas.microsoft.com/office/powerpoint/2010/main" id="1" dur="indefinite" restart="never" nodeType="tmRoot"/>
+        <p:cTn id="1" dur="indefinite" restart="never" nodeType="tmRoot"/>
       </p:par>
     </p:tnLst>
   </p:timing>
@@ -3769,15 +3834,51 @@
           <a:p>
             <a:r>
               <a:rPr lang="en-US" dirty="0" smtClean="0"/>
-              <a:t>Buffers support Unicode encodings:  '</a:t>
-            </a:r>
-            <a:r>
-              <a:rPr lang="en-US" dirty="0" err="1" smtClean="0"/>
+              <a:t>Buffers support Unicode encodings:  </a:t>
+            </a:r>
+            <a:r>
+              <a:rPr lang="en-US" dirty="0" smtClean="0">
+                <a:solidFill>
+                  <a:srgbClr val="FF0000"/>
+                </a:solidFill>
+              </a:rPr>
+              <a:t>'</a:t>
+            </a:r>
+            <a:r>
+              <a:rPr lang="en-US" dirty="0" err="1" smtClean="0">
+                <a:solidFill>
+                  <a:srgbClr val="FF0000"/>
+                </a:solidFill>
+              </a:rPr>
               <a:t>ascii</a:t>
             </a:r>
             <a:r>
               <a:rPr lang="en-US" dirty="0" smtClean="0"/>
-              <a:t>', 'hex', 'utf8'</a:t>
+              <a:t>', </a:t>
+            </a:r>
+            <a:r>
+              <a:rPr lang="en-US" dirty="0" smtClean="0">
+                <a:solidFill>
+                  <a:srgbClr val="FF0000"/>
+                </a:solidFill>
+              </a:rPr>
+              <a:t>'hex</a:t>
+            </a:r>
+            <a:r>
+              <a:rPr lang="en-US" dirty="0" smtClean="0"/>
+              <a:t>', </a:t>
+            </a:r>
+            <a:r>
+              <a:rPr lang="en-US" dirty="0" smtClean="0">
+                <a:solidFill>
+                  <a:srgbClr val="FF0000"/>
+                </a:solidFill>
+              </a:rPr>
+              <a:t>'utf8</a:t>
+            </a:r>
+            <a:r>
+              <a:rPr lang="en-US" dirty="0" smtClean="0"/>
+              <a:t>'</a:t>
             </a:r>
           </a:p>
           <a:p>
@@ -3798,22 +3899,14 @@
             <a:pPr lvl="1"/>
             <a:r>
               <a:rPr lang="en-US" dirty="0" smtClean="0"/>
-              <a:t>signed </a:t>
-            </a:r>
+              <a:t>signed &amp; unsigned 8-, 16- &amp; 32-bit integers</a:t>
+            </a:r>
+          </a:p>
+          <a:p>
+            <a:pPr lvl="1"/>
             <a:r>
               <a:rPr lang="en-US" dirty="0" smtClean="0"/>
-              <a:t>&amp; unsigned 8-, 16- &amp; 32-bit integers</a:t>
-            </a:r>
-          </a:p>
-          <a:p>
-            <a:pPr lvl="1"/>
-            <a:r>
-              <a:rPr lang="en-US" dirty="0" smtClean="0"/>
-              <a:t>32</a:t>
-            </a:r>
-            <a:r>
-              <a:rPr lang="en-US" dirty="0" smtClean="0"/>
-              <a:t>-bit </a:t>
+              <a:t>32-bit </a:t>
             </a:r>
             <a:r>
               <a:rPr lang="en-US" dirty="0"/>
@@ -3828,11 +3921,7 @@
             <a:pPr lvl="1"/>
             <a:r>
               <a:rPr lang="en-US" dirty="0" smtClean="0"/>
-              <a:t>64</a:t>
-            </a:r>
-            <a:r>
-              <a:rPr lang="en-US" dirty="0" smtClean="0"/>
-              <a:t>-bit </a:t>
+              <a:t>64-bit </a:t>
             </a:r>
             <a:r>
               <a:rPr lang="en-US" dirty="0"/>
@@ -3948,7 +4037,7 @@
   <p:timing>
     <p:tnLst>
       <p:par>
-        <p:cTn xmlns:p14="http://schemas.microsoft.com/office/powerpoint/2010/main" id="1" dur="indefinite" restart="never" nodeType="tmRoot"/>
+        <p:cTn id="1" dur="indefinite" restart="never" nodeType="tmRoot"/>
       </p:par>
     </p:tnLst>
   </p:timing>
@@ -5003,7 +5092,7 @@
   <p:timing>
     <p:tnLst>
       <p:par>
-        <p:cTn xmlns:p14="http://schemas.microsoft.com/office/powerpoint/2010/main" id="1" dur="indefinite" restart="never" nodeType="tmRoot"/>
+        <p:cTn id="1" dur="indefinite" restart="never" nodeType="tmRoot"/>
       </p:par>
     </p:tnLst>
   </p:timing>
@@ -5047,7 +5136,11 @@
               <a:t>Reading:  </a:t>
             </a:r>
             <a:r>
-              <a:rPr lang="en-US" sz="1800" dirty="0" smtClean="0">
+              <a:rPr lang="en-US" sz="2000" dirty="0" err="1" smtClean="0"/>
+              <a:t>stream.</a:t>
+            </a:r>
+            <a:r>
+              <a:rPr lang="en-US" sz="1800" dirty="0" err="1" smtClean="0">
                 <a:latin typeface="Monaco"/>
                 <a:cs typeface="Monaco"/>
               </a:rPr>
@@ -5059,10 +5152,20 @@
             </a:r>
             <a:r>
               <a:rPr lang="en-US" sz="1800" dirty="0" smtClean="0">
-                <a:latin typeface="Monaco"/>
-                <a:cs typeface="Monaco"/>
-              </a:rPr>
-              <a:t>'data'</a:t>
+                <a:solidFill>
+                  <a:srgbClr val="FF0000"/>
+                </a:solidFill>
+                <a:latin typeface="Monaco"/>
+                <a:cs typeface="Monaco"/>
+              </a:rPr>
+              <a:t>'data</a:t>
+            </a:r>
+            <a:r>
+              <a:rPr lang="en-US" sz="1800" dirty="0" smtClean="0">
+                <a:latin typeface="Monaco"/>
+                <a:cs typeface="Monaco"/>
+              </a:rPr>
+              <a:t>'</a:t>
             </a:r>
             <a:r>
               <a:rPr lang="en-US" sz="2000" dirty="0" smtClean="0"/>
@@ -5070,10 +5173,20 @@
             </a:r>
             <a:r>
               <a:rPr lang="en-US" sz="1800" dirty="0" smtClean="0">
-                <a:latin typeface="Monaco"/>
-                <a:cs typeface="Monaco"/>
-              </a:rPr>
-              <a:t>'readable'</a:t>
+                <a:solidFill>
+                  <a:srgbClr val="FF0000"/>
+                </a:solidFill>
+                <a:latin typeface="Monaco"/>
+                <a:cs typeface="Monaco"/>
+              </a:rPr>
+              <a:t>'readable</a:t>
+            </a:r>
+            <a:r>
+              <a:rPr lang="en-US" sz="1800" dirty="0" smtClean="0">
+                <a:latin typeface="Monaco"/>
+                <a:cs typeface="Monaco"/>
+              </a:rPr>
+              <a:t>'</a:t>
             </a:r>
           </a:p>
           <a:p>
@@ -5082,7 +5195,11 @@
               <a:t>Writing:  </a:t>
             </a:r>
             <a:r>
-              <a:rPr lang="en-US" sz="1800" dirty="0" smtClean="0">
+              <a:rPr lang="en-US" sz="2000" smtClean="0"/>
+              <a:t>stream.</a:t>
+            </a:r>
+            <a:r>
+              <a:rPr lang="en-US" sz="1800" smtClean="0">
                 <a:latin typeface="Monaco"/>
                 <a:cs typeface="Monaco"/>
               </a:rPr>
@@ -5476,10 +5593,20 @@
             </a:r>
             <a:r>
               <a:rPr lang="en-US" sz="2000" dirty="0" smtClean="0">
-                <a:latin typeface="Monaco"/>
-                <a:cs typeface="Monaco"/>
-              </a:rPr>
-              <a:t>'readable'</a:t>
+                <a:solidFill>
+                  <a:srgbClr val="FF0000"/>
+                </a:solidFill>
+                <a:latin typeface="Monaco"/>
+                <a:cs typeface="Monaco"/>
+              </a:rPr>
+              <a:t>'readable</a:t>
+            </a:r>
+            <a:r>
+              <a:rPr lang="en-US" sz="2000" dirty="0" smtClean="0">
+                <a:latin typeface="Monaco"/>
+                <a:cs typeface="Monaco"/>
+              </a:rPr>
+              <a:t>'</a:t>
             </a:r>
             <a:r>
               <a:rPr lang="en-US" dirty="0" smtClean="0"/>
@@ -5487,10 +5614,20 @@
             </a:r>
             <a:r>
               <a:rPr lang="en-US" sz="2000" dirty="0" smtClean="0">
-                <a:latin typeface="Monaco"/>
-                <a:cs typeface="Monaco"/>
-              </a:rPr>
-              <a:t>'data'</a:t>
+                <a:solidFill>
+                  <a:srgbClr val="FF0000"/>
+                </a:solidFill>
+                <a:latin typeface="Monaco"/>
+                <a:cs typeface="Monaco"/>
+              </a:rPr>
+              <a:t>'data</a:t>
+            </a:r>
+            <a:r>
+              <a:rPr lang="en-US" sz="2000" dirty="0" smtClean="0">
+                <a:latin typeface="Monaco"/>
+                <a:cs typeface="Monaco"/>
+              </a:rPr>
+              <a:t>'</a:t>
             </a:r>
             <a:r>
               <a:rPr lang="en-US" dirty="0" smtClean="0"/>
@@ -5498,10 +5635,20 @@
             </a:r>
             <a:r>
               <a:rPr lang="en-US" sz="2000" dirty="0" smtClean="0">
-                <a:latin typeface="Monaco"/>
-                <a:cs typeface="Monaco"/>
-              </a:rPr>
-              <a:t>'end'</a:t>
+                <a:solidFill>
+                  <a:srgbClr val="FF0000"/>
+                </a:solidFill>
+                <a:latin typeface="Monaco"/>
+                <a:cs typeface="Monaco"/>
+              </a:rPr>
+              <a:t>'end</a:t>
+            </a:r>
+            <a:r>
+              <a:rPr lang="en-US" sz="2000" dirty="0" smtClean="0">
+                <a:latin typeface="Monaco"/>
+                <a:cs typeface="Monaco"/>
+              </a:rPr>
+              <a:t>'</a:t>
             </a:r>
             <a:r>
               <a:rPr lang="en-US" dirty="0" smtClean="0"/>
@@ -5509,10 +5656,20 @@
             </a:r>
             <a:r>
               <a:rPr lang="en-US" sz="2000" dirty="0" smtClean="0">
-                <a:latin typeface="Monaco"/>
-                <a:cs typeface="Monaco"/>
-              </a:rPr>
-              <a:t>'close'</a:t>
+                <a:solidFill>
+                  <a:srgbClr val="FF0000"/>
+                </a:solidFill>
+                <a:latin typeface="Monaco"/>
+                <a:cs typeface="Monaco"/>
+              </a:rPr>
+              <a:t>'close</a:t>
+            </a:r>
+            <a:r>
+              <a:rPr lang="en-US" sz="2000" dirty="0" smtClean="0">
+                <a:latin typeface="Monaco"/>
+                <a:cs typeface="Monaco"/>
+              </a:rPr>
+              <a:t>'</a:t>
             </a:r>
             <a:r>
               <a:rPr lang="en-US" dirty="0" smtClean="0"/>
@@ -5520,10 +5677,20 @@
             </a:r>
             <a:r>
               <a:rPr lang="en-US" sz="2000" dirty="0" smtClean="0">
-                <a:latin typeface="Monaco"/>
-                <a:cs typeface="Monaco"/>
-              </a:rPr>
-              <a:t>'error'</a:t>
+                <a:solidFill>
+                  <a:srgbClr val="FF0000"/>
+                </a:solidFill>
+                <a:latin typeface="Monaco"/>
+                <a:cs typeface="Monaco"/>
+              </a:rPr>
+              <a:t>'error</a:t>
+            </a:r>
+            <a:r>
+              <a:rPr lang="en-US" sz="2000" dirty="0" smtClean="0">
+                <a:latin typeface="Monaco"/>
+                <a:cs typeface="Monaco"/>
+              </a:rPr>
+              <a:t>'</a:t>
             </a:r>
           </a:p>
           <a:p>
@@ -5546,10 +5713,20 @@
             </a:r>
             <a:r>
               <a:rPr lang="en-US" sz="2000" dirty="0" smtClean="0">
-                <a:latin typeface="Monaco"/>
-                <a:cs typeface="Monaco"/>
-              </a:rPr>
-              <a:t>'readable'</a:t>
+                <a:solidFill>
+                  <a:srgbClr val="FF0000"/>
+                </a:solidFill>
+                <a:latin typeface="Monaco"/>
+                <a:cs typeface="Monaco"/>
+              </a:rPr>
+              <a:t>'readable</a:t>
+            </a:r>
+            <a:r>
+              <a:rPr lang="en-US" sz="2000" dirty="0" smtClean="0">
+                <a:latin typeface="Monaco"/>
+                <a:cs typeface="Monaco"/>
+              </a:rPr>
+              <a:t>'</a:t>
             </a:r>
             <a:r>
               <a:rPr lang="en-US" dirty="0" smtClean="0"/>
@@ -5595,10 +5772,20 @@
             </a:r>
             <a:r>
               <a:rPr lang="en-US" sz="2000" dirty="0" smtClean="0">
-                <a:latin typeface="Monaco"/>
-                <a:cs typeface="Monaco"/>
-              </a:rPr>
-              <a:t>'data'</a:t>
+                <a:solidFill>
+                  <a:srgbClr val="FF0000"/>
+                </a:solidFill>
+                <a:latin typeface="Monaco"/>
+                <a:cs typeface="Monaco"/>
+              </a:rPr>
+              <a:t>'data</a:t>
+            </a:r>
+            <a:r>
+              <a:rPr lang="en-US" sz="2000" dirty="0" smtClean="0">
+                <a:latin typeface="Monaco"/>
+                <a:cs typeface="Monaco"/>
+              </a:rPr>
+              <a:t>'</a:t>
             </a:r>
             <a:r>
               <a:rPr lang="en-US" dirty="0" smtClean="0"/>
@@ -5742,11 +5929,7 @@
           <a:p>
             <a:r>
               <a:rPr lang="en-US" dirty="0" smtClean="0"/>
-              <a:t>Reading: </a:t>
-            </a:r>
-            <a:r>
-              <a:rPr lang="en-US" dirty="0" smtClean="0"/>
-              <a:t>Non-Flowing Mode</a:t>
+              <a:t>Reading: Non-Flowing Mode</a:t>
             </a:r>
             <a:endParaRPr lang="en-US" dirty="0"/>
           </a:p>
@@ -6198,18 +6381,6 @@
               </a:rPr>
               <a:t>eadable</a:t>
             </a:r>
-            <a:endParaRPr kumimoji="0" lang="en-US" sz="2000" i="1" u="none" strike="noStrike" cap="none" normalizeH="0" baseline="0" dirty="0" smtClean="0">
-              <a:ln>
-                <a:noFill/>
-              </a:ln>
-              <a:solidFill>
-                <a:schemeClr val="tx2">
-                  <a:lumMod val="75000"/>
-                </a:schemeClr>
-              </a:solidFill>
-              <a:effectLst/>
-              <a:latin typeface="Calibri" pitchFamily="34" charset="0"/>
-            </a:endParaRPr>
           </a:p>
         </p:txBody>
       </p:sp>
@@ -6959,18 +7130,6 @@
               </a:rPr>
               <a:t>eadable</a:t>
             </a:r>
-            <a:endParaRPr kumimoji="0" lang="en-US" sz="2000" i="1" u="none" strike="noStrike" cap="none" normalizeH="0" baseline="0" dirty="0" smtClean="0">
-              <a:ln>
-                <a:noFill/>
-              </a:ln>
-              <a:solidFill>
-                <a:schemeClr val="tx2">
-                  <a:lumMod val="75000"/>
-                </a:schemeClr>
-              </a:solidFill>
-              <a:effectLst/>
-              <a:latin typeface="Calibri" pitchFamily="34" charset="0"/>
-            </a:endParaRPr>
           </a:p>
         </p:txBody>
       </p:sp>
@@ -7284,12 +7443,18 @@
             </a:r>
             <a:r>
               <a:rPr lang="en-US" sz="2000" dirty="0" err="1" smtClean="0">
+                <a:solidFill>
+                  <a:srgbClr val="FF0000"/>
+                </a:solidFill>
                 <a:latin typeface="Monaco"/>
                 <a:cs typeface="Monaco"/>
               </a:rPr>
               <a:t>stream.Writable</a:t>
             </a:r>
             <a:endParaRPr lang="en-US" sz="2000" dirty="0" smtClean="0">
+              <a:solidFill>
+                <a:srgbClr val="FF0000"/>
+              </a:solidFill>
               <a:latin typeface="Monaco"/>
               <a:cs typeface="Monaco"/>
             </a:endParaRPr>
@@ -7315,6 +7480,9 @@
             <a:pPr lvl="1"/>
             <a:r>
               <a:rPr lang="en-US" sz="2000" dirty="0" smtClean="0">
+                <a:solidFill>
+                  <a:srgbClr val="FF0000"/>
+                </a:solidFill>
                 <a:latin typeface="Monaco"/>
                 <a:cs typeface="Monaco"/>
               </a:rPr>
@@ -7334,6 +7502,9 @@
             <a:pPr lvl="1"/>
             <a:r>
               <a:rPr lang="en-US" sz="2000" dirty="0" smtClean="0">
+                <a:solidFill>
+                  <a:srgbClr val="FF0000"/>
+                </a:solidFill>
                 <a:latin typeface="Monaco"/>
                 <a:cs typeface="Monaco"/>
               </a:rPr>
@@ -7353,6 +7524,9 @@
             <a:pPr lvl="1"/>
             <a:r>
               <a:rPr lang="en-US" sz="2000" dirty="0" smtClean="0">
+                <a:solidFill>
+                  <a:srgbClr val="FF0000"/>
+                </a:solidFill>
                 <a:latin typeface="Monaco"/>
                 <a:cs typeface="Monaco"/>
               </a:rPr>
@@ -7372,6 +7546,9 @@
             <a:pPr lvl="1"/>
             <a:r>
               <a:rPr lang="en-US" sz="2000" dirty="0" err="1" smtClean="0">
+                <a:solidFill>
+                  <a:srgbClr val="FF0000"/>
+                </a:solidFill>
                 <a:latin typeface="Monaco"/>
                 <a:cs typeface="Monaco"/>
               </a:rPr>
@@ -7395,6 +7572,9 @@
             <a:pPr lvl="1"/>
             <a:r>
               <a:rPr lang="en-US" sz="2000" dirty="0" smtClean="0">
+                <a:solidFill>
+                  <a:srgbClr val="FF0000"/>
+                </a:solidFill>
                 <a:latin typeface="Monaco"/>
                 <a:cs typeface="Monaco"/>
               </a:rPr>
@@ -7424,21 +7604,8 @@
             </a:r>
             <a:r>
               <a:rPr lang="en-US" dirty="0" smtClean="0"/>
-              <a:t> </a:t>
-            </a:r>
-            <a:r>
-              <a:rPr lang="en-US" dirty="0" smtClean="0"/>
-              <a:t>to determine if </a:t>
-            </a:r>
-            <a:r>
-              <a:rPr lang="en-US" dirty="0" smtClean="0"/>
-              <a:t>all data </a:t>
-            </a:r>
-            <a:r>
-              <a:rPr lang="en-US" dirty="0" smtClean="0"/>
-              <a:t>was written</a:t>
-            </a:r>
-            <a:endParaRPr lang="en-US" dirty="0" smtClean="0"/>
+              <a:t> to determine if all data was written</a:t>
+            </a:r>
           </a:p>
           <a:p>
             <a:r>
@@ -7447,10 +7614,20 @@
             </a:r>
             <a:r>
               <a:rPr lang="en-US" sz="2000" dirty="0" smtClean="0">
-                <a:latin typeface="Monaco"/>
-                <a:cs typeface="Monaco"/>
-              </a:rPr>
-              <a:t>'drain'</a:t>
+                <a:solidFill>
+                  <a:srgbClr val="FF0000"/>
+                </a:solidFill>
+                <a:latin typeface="Monaco"/>
+                <a:cs typeface="Monaco"/>
+              </a:rPr>
+              <a:t>'drain</a:t>
+            </a:r>
+            <a:r>
+              <a:rPr lang="en-US" sz="2000" dirty="0" smtClean="0">
+                <a:latin typeface="Monaco"/>
+                <a:cs typeface="Monaco"/>
+              </a:rPr>
+              <a:t>'</a:t>
             </a:r>
             <a:r>
               <a:rPr lang="en-US" dirty="0" smtClean="0"/>
@@ -8184,7 +8361,7 @@
   <p:timing>
     <p:tnLst>
       <p:par>
-        <p:cTn xmlns:p14="http://schemas.microsoft.com/office/powerpoint/2010/main" id="1" dur="indefinite" restart="never" nodeType="tmRoot"/>
+        <p:cTn id="1" dur="indefinite" restart="never" nodeType="tmRoot"/>
       </p:par>
     </p:tnLst>
   </p:timing>
@@ -9543,37 +9720,7 @@
                 <a:effectLst/>
                 <a:latin typeface="Calibri" pitchFamily="34" charset="0"/>
               </a:rPr>
-              <a:t>If not done, wait </a:t>
-            </a:r>
-            <a:r>
-              <a:rPr kumimoji="0" lang="en-US" sz="2000" i="1" u="none" strike="noStrike" cap="none" normalizeH="0" baseline="0" dirty="0" smtClean="0">
-                <a:ln>
-                  <a:noFill/>
-                </a:ln>
-                <a:solidFill>
-                  <a:schemeClr val="tx2">
-                    <a:lumMod val="75000"/>
-                  </a:schemeClr>
-                </a:solidFill>
-                <a:effectLst/>
-                <a:latin typeface="Calibri" pitchFamily="34" charset="0"/>
-              </a:rPr>
-              <a:t>until </a:t>
-            </a:r>
-            <a:r>
-              <a:rPr kumimoji="0" lang="en-US" sz="2000" i="1" u="none" strike="noStrike" cap="none" normalizeH="0" baseline="0" dirty="0" smtClean="0">
-                <a:ln>
-                  <a:noFill/>
-                </a:ln>
-                <a:solidFill>
-                  <a:schemeClr val="tx2">
-                    <a:lumMod val="75000"/>
-                  </a:schemeClr>
-                </a:solidFill>
-                <a:effectLst/>
-                <a:latin typeface="Calibri" pitchFamily="34" charset="0"/>
-              </a:rPr>
-              <a:t>out has</a:t>
+              <a:t>If not done, wait until out has</a:t>
             </a:r>
             <a:r>
               <a:rPr kumimoji="0" lang="en-US" sz="2000" i="1" u="none" strike="noStrike" cap="none" normalizeH="0" dirty="0" smtClean="0">
@@ -10291,7 +10438,7 @@
   <p:timing>
     <p:tnLst>
       <p:par>
-        <p:cTn xmlns:p14="http://schemas.microsoft.com/office/powerpoint/2010/main" id="1" dur="indefinite" restart="never" nodeType="tmRoot">
+        <p:cTn id="1" dur="indefinite" restart="never" nodeType="tmRoot">
           <p:childTnLst>
             <p:seq concurrent="1" nextAc="seek">
               <p:cTn id="2" dur="indefinite" nodeType="mainSeq">
@@ -10750,6 +10897,9 @@
             <a:pPr lvl="1"/>
             <a:r>
               <a:rPr lang="en-US" sz="2000" dirty="0" err="1" smtClean="0">
+                <a:solidFill>
+                  <a:srgbClr val="FF0000"/>
+                </a:solidFill>
                 <a:latin typeface="Monaco"/>
                 <a:cs typeface="Monaco"/>
               </a:rPr>
@@ -10757,6 +10907,9 @@
             </a:r>
             <a:r>
               <a:rPr lang="en-US" sz="2000" dirty="0" smtClean="0">
+                <a:solidFill>
+                  <a:srgbClr val="FF0000"/>
+                </a:solidFill>
                 <a:latin typeface="Monaco"/>
                 <a:cs typeface="Monaco"/>
               </a:rPr>
@@ -10775,7 +10928,6 @@
               <a:rPr lang="en-US" dirty="0" smtClean="0"/>
               <a:t>indefinitely</a:t>
             </a:r>
-            <a:endParaRPr lang="en-US" dirty="0" smtClean="0"/>
           </a:p>
           <a:p>
             <a:pPr lvl="1"/>
@@ -10853,6 +11005,9 @@
             <a:pPr lvl="1"/>
             <a:r>
               <a:rPr lang="en-US" sz="2000" dirty="0" err="1" smtClean="0">
+                <a:solidFill>
+                  <a:srgbClr val="FF0000"/>
+                </a:solidFill>
                 <a:latin typeface="Monaco"/>
                 <a:cs typeface="Monaco"/>
               </a:rPr>
@@ -10860,6 +11015,9 @@
             </a:r>
             <a:r>
               <a:rPr lang="en-US" sz="2000" dirty="0" smtClean="0">
+                <a:solidFill>
+                  <a:srgbClr val="FF0000"/>
+                </a:solidFill>
                 <a:latin typeface="Monaco"/>
                 <a:cs typeface="Monaco"/>
               </a:rPr>
@@ -10962,7 +11120,7 @@
   <p:timing>
     <p:tnLst>
       <p:par>
-        <p:cTn xmlns:p14="http://schemas.microsoft.com/office/powerpoint/2010/main" id="1" dur="indefinite" restart="never" nodeType="tmRoot"/>
+        <p:cTn id="1" dur="indefinite" restart="never" nodeType="tmRoot"/>
       </p:par>
     </p:tnLst>
   </p:timing>

</xml_diff>